<commit_message>
manca tabella bic, sistemare foto in relazione, aggiustare un po' tutto discorso e SBM nelle slide
</commit_message>
<xml_diff>
--- a/Analysis of visual cortical neurons of mice.pptx
+++ b/Analysis of visual cortical neurons of mice.pptx
@@ -13,6 +13,13 @@
     <p:sldId id="261" r:id="rId7"/>
     <p:sldId id="262" r:id="rId8"/>
     <p:sldId id="263" r:id="rId9"/>
+    <p:sldId id="271" r:id="rId10"/>
+    <p:sldId id="264" r:id="rId11"/>
+    <p:sldId id="265" r:id="rId12"/>
+    <p:sldId id="267" r:id="rId13"/>
+    <p:sldId id="269" r:id="rId14"/>
+    <p:sldId id="270" r:id="rId15"/>
+    <p:sldId id="272" r:id="rId16"/>
   </p:sldIdLst>
   <p:sldSz cx="12192000" cy="6858000"/>
   <p:notesSz cx="6858000" cy="9144000"/>
@@ -111,6 +118,11 @@
       </a:defRPr>
     </a:lvl9pPr>
   </p:defaultTextStyle>
+  <p:extLst>
+    <p:ext uri="{EFAFB233-063F-42B5-8137-9DF3F51BA10A}">
+      <p15:sldGuideLst xmlns:p15="http://schemas.microsoft.com/office/powerpoint/2012/main"/>
+    </p:ext>
+  </p:extLst>
 </p:presentation>
 </file>
 
@@ -3386,7 +3398,7 @@
           <a:p>
             <a:fld id="{EFAFCA26-576F-4319-84BF-E37C356C64C8}" type="datetimeFigureOut">
               <a:rPr lang="it-IT" smtClean="0"/>
-              <a:t>23/05/2024</a:t>
+              <a:t>24/05/2024</a:t>
             </a:fld>
             <a:endParaRPr lang="it-IT"/>
           </a:p>
@@ -3584,7 +3596,7 @@
           <a:p>
             <a:fld id="{EFAFCA26-576F-4319-84BF-E37C356C64C8}" type="datetimeFigureOut">
               <a:rPr lang="it-IT" smtClean="0"/>
-              <a:t>23/05/2024</a:t>
+              <a:t>24/05/2024</a:t>
             </a:fld>
             <a:endParaRPr lang="it-IT"/>
           </a:p>
@@ -3792,7 +3804,7 @@
           <a:p>
             <a:fld id="{EFAFCA26-576F-4319-84BF-E37C356C64C8}" type="datetimeFigureOut">
               <a:rPr lang="it-IT" smtClean="0"/>
-              <a:t>23/05/2024</a:t>
+              <a:t>24/05/2024</a:t>
             </a:fld>
             <a:endParaRPr lang="it-IT"/>
           </a:p>
@@ -3990,7 +4002,7 @@
           <a:p>
             <a:fld id="{EFAFCA26-576F-4319-84BF-E37C356C64C8}" type="datetimeFigureOut">
               <a:rPr lang="it-IT" smtClean="0"/>
-              <a:t>23/05/2024</a:t>
+              <a:t>24/05/2024</a:t>
             </a:fld>
             <a:endParaRPr lang="it-IT"/>
           </a:p>
@@ -4265,7 +4277,7 @@
           <a:p>
             <a:fld id="{EFAFCA26-576F-4319-84BF-E37C356C64C8}" type="datetimeFigureOut">
               <a:rPr lang="it-IT" smtClean="0"/>
-              <a:t>23/05/2024</a:t>
+              <a:t>24/05/2024</a:t>
             </a:fld>
             <a:endParaRPr lang="it-IT"/>
           </a:p>
@@ -4530,7 +4542,7 @@
           <a:p>
             <a:fld id="{EFAFCA26-576F-4319-84BF-E37C356C64C8}" type="datetimeFigureOut">
               <a:rPr lang="it-IT" smtClean="0"/>
-              <a:t>23/05/2024</a:t>
+              <a:t>24/05/2024</a:t>
             </a:fld>
             <a:endParaRPr lang="it-IT"/>
           </a:p>
@@ -4942,7 +4954,7 @@
           <a:p>
             <a:fld id="{EFAFCA26-576F-4319-84BF-E37C356C64C8}" type="datetimeFigureOut">
               <a:rPr lang="it-IT" smtClean="0"/>
-              <a:t>23/05/2024</a:t>
+              <a:t>24/05/2024</a:t>
             </a:fld>
             <a:endParaRPr lang="it-IT"/>
           </a:p>
@@ -5083,7 +5095,7 @@
           <a:p>
             <a:fld id="{EFAFCA26-576F-4319-84BF-E37C356C64C8}" type="datetimeFigureOut">
               <a:rPr lang="it-IT" smtClean="0"/>
-              <a:t>23/05/2024</a:t>
+              <a:t>24/05/2024</a:t>
             </a:fld>
             <a:endParaRPr lang="it-IT"/>
           </a:p>
@@ -5196,7 +5208,7 @@
           <a:p>
             <a:fld id="{EFAFCA26-576F-4319-84BF-E37C356C64C8}" type="datetimeFigureOut">
               <a:rPr lang="it-IT" smtClean="0"/>
-              <a:t>23/05/2024</a:t>
+              <a:t>24/05/2024</a:t>
             </a:fld>
             <a:endParaRPr lang="it-IT"/>
           </a:p>
@@ -5507,7 +5519,7 @@
           <a:p>
             <a:fld id="{EFAFCA26-576F-4319-84BF-E37C356C64C8}" type="datetimeFigureOut">
               <a:rPr lang="it-IT" smtClean="0"/>
-              <a:t>23/05/2024</a:t>
+              <a:t>24/05/2024</a:t>
             </a:fld>
             <a:endParaRPr lang="it-IT"/>
           </a:p>
@@ -5795,7 +5807,7 @@
           <a:p>
             <a:fld id="{EFAFCA26-576F-4319-84BF-E37C356C64C8}" type="datetimeFigureOut">
               <a:rPr lang="it-IT" smtClean="0"/>
-              <a:t>23/05/2024</a:t>
+              <a:t>24/05/2024</a:t>
             </a:fld>
             <a:endParaRPr lang="it-IT"/>
           </a:p>
@@ -6036,7 +6048,7 @@
           <a:p>
             <a:fld id="{EFAFCA26-576F-4319-84BF-E37C356C64C8}" type="datetimeFigureOut">
               <a:rPr lang="it-IT" smtClean="0"/>
-              <a:t>23/05/2024</a:t>
+              <a:t>24/05/2024</a:t>
             </a:fld>
             <a:endParaRPr lang="it-IT"/>
           </a:p>
@@ -6934,6 +6946,925 @@
 </p:sld>
 </file>
 
+<file path=ppt/slides/slide10.xml><?xml version="1.0" encoding="utf-8"?>
+<p:sld xmlns:a="http://schemas.openxmlformats.org/drawingml/2006/main" xmlns:r="http://schemas.openxmlformats.org/officeDocument/2006/relationships" xmlns:p="http://schemas.openxmlformats.org/presentationml/2006/main">
+  <p:cSld>
+    <p:spTree>
+      <p:nvGrpSpPr>
+        <p:cNvPr id="1" name=""/>
+        <p:cNvGrpSpPr/>
+        <p:nvPr/>
+      </p:nvGrpSpPr>
+      <p:grpSpPr>
+        <a:xfrm>
+          <a:off x="0" y="0"/>
+          <a:ext cx="0" cy="0"/>
+          <a:chOff x="0" y="0"/>
+          <a:chExt cx="0" cy="0"/>
+        </a:xfrm>
+      </p:grpSpPr>
+      <p:sp>
+        <p:nvSpPr>
+          <p:cNvPr id="2" name="Titolo 1">
+            <a:extLst>
+              <a:ext uri="{FF2B5EF4-FFF2-40B4-BE49-F238E27FC236}">
+                <a16:creationId xmlns:a16="http://schemas.microsoft.com/office/drawing/2014/main" id="{D61E145F-20B8-C6C3-FB30-F0FCD429311B}"/>
+              </a:ext>
+            </a:extLst>
+          </p:cNvPr>
+          <p:cNvSpPr>
+            <a:spLocks noGrp="1"/>
+          </p:cNvSpPr>
+          <p:nvPr>
+            <p:ph type="title"/>
+          </p:nvPr>
+        </p:nvSpPr>
+        <p:spPr>
+          <a:xfrm>
+            <a:off x="838200" y="365126"/>
+            <a:ext cx="10515600" cy="716422"/>
+          </a:xfrm>
+        </p:spPr>
+        <p:txBody>
+          <a:bodyPr/>
+          <a:lstStyle/>
+          <a:p>
+            <a:r>
+              <a:rPr lang="it-IT" dirty="0"/>
+              <a:t>Scelta del modello</a:t>
+            </a:r>
+          </a:p>
+        </p:txBody>
+      </p:sp>
+      <p:sp>
+        <p:nvSpPr>
+          <p:cNvPr id="3" name="Segnaposto contenuto 2">
+            <a:extLst>
+              <a:ext uri="{FF2B5EF4-FFF2-40B4-BE49-F238E27FC236}">
+                <a16:creationId xmlns:a16="http://schemas.microsoft.com/office/drawing/2014/main" id="{65C3A8F1-D4F8-6AA1-1849-C088657A9F31}"/>
+              </a:ext>
+            </a:extLst>
+          </p:cNvPr>
+          <p:cNvSpPr>
+            <a:spLocks noGrp="1"/>
+          </p:cNvSpPr>
+          <p:nvPr>
+            <p:ph idx="1"/>
+          </p:nvPr>
+        </p:nvSpPr>
+        <p:spPr>
+          <a:xfrm>
+            <a:off x="838200" y="1258529"/>
+            <a:ext cx="10515600" cy="4918434"/>
+          </a:xfrm>
+        </p:spPr>
+        <p:txBody>
+          <a:bodyPr/>
+          <a:lstStyle/>
+          <a:p>
+            <a:r>
+              <a:rPr lang="it-IT" dirty="0"/>
+              <a:t>Assumere che le sinapsi avvengano con la stessa probabilità in tutta la rete è riduttivo</a:t>
+            </a:r>
+          </a:p>
+          <a:p>
+            <a:r>
+              <a:rPr lang="it-IT" dirty="0"/>
+              <a:t>Abbiamo costruito vari modelli aumentandone gradualmente la complessità, al fine di catturare la dinamica reale delle relazioni tra neuroni</a:t>
+            </a:r>
+          </a:p>
+          <a:p>
+            <a:r>
+              <a:rPr lang="it-IT" dirty="0"/>
+              <a:t>Abbiamo confrontato i modelli in base alla bontà dell’adattamento, selezionando quelli con BIC minore</a:t>
+            </a:r>
+          </a:p>
+        </p:txBody>
+      </p:sp>
+    </p:spTree>
+    <p:extLst>
+      <p:ext uri="{BB962C8B-B14F-4D97-AF65-F5344CB8AC3E}">
+        <p14:creationId xmlns:p14="http://schemas.microsoft.com/office/powerpoint/2010/main" val="2628910944"/>
+      </p:ext>
+    </p:extLst>
+  </p:cSld>
+  <p:clrMapOvr>
+    <a:masterClrMapping/>
+  </p:clrMapOvr>
+</p:sld>
+</file>
+
+<file path=ppt/slides/slide11.xml><?xml version="1.0" encoding="utf-8"?>
+<p:sld xmlns:a="http://schemas.openxmlformats.org/drawingml/2006/main" xmlns:r="http://schemas.openxmlformats.org/officeDocument/2006/relationships" xmlns:p="http://schemas.openxmlformats.org/presentationml/2006/main">
+  <p:cSld>
+    <p:spTree>
+      <p:nvGrpSpPr>
+        <p:cNvPr id="1" name=""/>
+        <p:cNvGrpSpPr/>
+        <p:nvPr/>
+      </p:nvGrpSpPr>
+      <p:grpSpPr>
+        <a:xfrm>
+          <a:off x="0" y="0"/>
+          <a:ext cx="0" cy="0"/>
+          <a:chOff x="0" y="0"/>
+          <a:chExt cx="0" cy="0"/>
+        </a:xfrm>
+      </p:grpSpPr>
+      <p:sp>
+        <p:nvSpPr>
+          <p:cNvPr id="2" name="Titolo 1">
+            <a:extLst>
+              <a:ext uri="{FF2B5EF4-FFF2-40B4-BE49-F238E27FC236}">
+                <a16:creationId xmlns:a16="http://schemas.microsoft.com/office/drawing/2014/main" id="{6740816E-FCA9-3F09-AD8F-A24968A09C8F}"/>
+              </a:ext>
+            </a:extLst>
+          </p:cNvPr>
+          <p:cNvSpPr>
+            <a:spLocks noGrp="1"/>
+          </p:cNvSpPr>
+          <p:nvPr>
+            <p:ph type="title"/>
+          </p:nvPr>
+        </p:nvSpPr>
+        <p:spPr/>
+        <p:txBody>
+          <a:bodyPr/>
+          <a:lstStyle/>
+          <a:p>
+            <a:r>
+              <a:rPr lang="it-IT" dirty="0"/>
+              <a:t>Scelta del modello /</a:t>
+            </a:r>
+            <a:r>
+              <a:rPr lang="it-IT" dirty="0" err="1"/>
+              <a:t>cont</a:t>
+            </a:r>
+            <a:r>
+              <a:rPr lang="it-IT" dirty="0"/>
+              <a:t>.</a:t>
+            </a:r>
+          </a:p>
+        </p:txBody>
+      </p:sp>
+      <p:sp>
+        <p:nvSpPr>
+          <p:cNvPr id="3" name="Segnaposto contenuto 2">
+            <a:extLst>
+              <a:ext uri="{FF2B5EF4-FFF2-40B4-BE49-F238E27FC236}">
+                <a16:creationId xmlns:a16="http://schemas.microsoft.com/office/drawing/2014/main" id="{34EC5F02-2EE9-BE45-D1F0-E4F98E0F74F4}"/>
+              </a:ext>
+            </a:extLst>
+          </p:cNvPr>
+          <p:cNvSpPr>
+            <a:spLocks noGrp="1"/>
+          </p:cNvSpPr>
+          <p:nvPr>
+            <p:ph idx="1"/>
+          </p:nvPr>
+        </p:nvSpPr>
+        <p:spPr/>
+        <p:txBody>
+          <a:bodyPr/>
+          <a:lstStyle/>
+          <a:p>
+            <a:endParaRPr lang="it-IT" dirty="0"/>
+          </a:p>
+        </p:txBody>
+      </p:sp>
+    </p:spTree>
+    <p:extLst>
+      <p:ext uri="{BB962C8B-B14F-4D97-AF65-F5344CB8AC3E}">
+        <p14:creationId xmlns:p14="http://schemas.microsoft.com/office/powerpoint/2010/main" val="2958067582"/>
+      </p:ext>
+    </p:extLst>
+  </p:cSld>
+  <p:clrMapOvr>
+    <a:masterClrMapping/>
+  </p:clrMapOvr>
+</p:sld>
+</file>
+
+<file path=ppt/slides/slide12.xml><?xml version="1.0" encoding="utf-8"?>
+<p:sld xmlns:a="http://schemas.openxmlformats.org/drawingml/2006/main" xmlns:r="http://schemas.openxmlformats.org/officeDocument/2006/relationships" xmlns:p="http://schemas.openxmlformats.org/presentationml/2006/main">
+  <p:cSld>
+    <p:spTree>
+      <p:nvGrpSpPr>
+        <p:cNvPr id="1" name=""/>
+        <p:cNvGrpSpPr/>
+        <p:nvPr/>
+      </p:nvGrpSpPr>
+      <p:grpSpPr>
+        <a:xfrm>
+          <a:off x="0" y="0"/>
+          <a:ext cx="0" cy="0"/>
+          <a:chOff x="0" y="0"/>
+          <a:chExt cx="0" cy="0"/>
+        </a:xfrm>
+      </p:grpSpPr>
+      <p:sp>
+        <p:nvSpPr>
+          <p:cNvPr id="2" name="Titolo 1">
+            <a:extLst>
+              <a:ext uri="{FF2B5EF4-FFF2-40B4-BE49-F238E27FC236}">
+                <a16:creationId xmlns:a16="http://schemas.microsoft.com/office/drawing/2014/main" id="{C916FF00-754A-4B0A-DFCA-858390861337}"/>
+              </a:ext>
+            </a:extLst>
+          </p:cNvPr>
+          <p:cNvSpPr>
+            <a:spLocks noGrp="1"/>
+          </p:cNvSpPr>
+          <p:nvPr>
+            <p:ph type="title"/>
+          </p:nvPr>
+        </p:nvSpPr>
+        <p:spPr>
+          <a:xfrm>
+            <a:off x="838200" y="365126"/>
+            <a:ext cx="10515600" cy="824578"/>
+          </a:xfrm>
+        </p:spPr>
+        <p:txBody>
+          <a:bodyPr/>
+          <a:lstStyle/>
+          <a:p>
+            <a:r>
+              <a:rPr lang="it-IT" dirty="0"/>
+              <a:t>Markov model senza triangoli - Risultati</a:t>
+            </a:r>
+          </a:p>
+        </p:txBody>
+      </p:sp>
+      <p:graphicFrame>
+        <p:nvGraphicFramePr>
+          <p:cNvPr id="5" name="Segnaposto contenuto 4">
+            <a:extLst>
+              <a:ext uri="{FF2B5EF4-FFF2-40B4-BE49-F238E27FC236}">
+                <a16:creationId xmlns:a16="http://schemas.microsoft.com/office/drawing/2014/main" id="{EB25189E-0B6F-BA1B-D62A-FD17E8224D7E}"/>
+              </a:ext>
+            </a:extLst>
+          </p:cNvPr>
+          <p:cNvGraphicFramePr>
+            <a:graphicFrameLocks noGrp="1"/>
+          </p:cNvGraphicFramePr>
+          <p:nvPr>
+            <p:ph idx="1"/>
+            <p:extLst>
+              <p:ext uri="{D42A27DB-BD31-4B8C-83A1-F6EECF244321}">
+                <p14:modId xmlns:p14="http://schemas.microsoft.com/office/powerpoint/2010/main" val="143377751"/>
+              </p:ext>
+            </p:extLst>
+          </p:nvPr>
+        </p:nvGraphicFramePr>
+        <p:xfrm>
+          <a:off x="838200" y="1825625"/>
+          <a:ext cx="10515600" cy="2225040"/>
+        </p:xfrm>
+        <a:graphic>
+          <a:graphicData uri="http://schemas.openxmlformats.org/drawingml/2006/table">
+            <a:tbl>
+              <a:tblPr firstRow="1" bandRow="1">
+                <a:tableStyleId>{5C22544A-7EE6-4342-B048-85BDC9FD1C3A}</a:tableStyleId>
+              </a:tblPr>
+              <a:tblGrid>
+                <a:gridCol w="5257800">
+                  <a:extLst>
+                    <a:ext uri="{9D8B030D-6E8A-4147-A177-3AD203B41FA5}">
+                      <a16:colId xmlns:a16="http://schemas.microsoft.com/office/drawing/2014/main" val="2465990435"/>
+                    </a:ext>
+                  </a:extLst>
+                </a:gridCol>
+                <a:gridCol w="5257800">
+                  <a:extLst>
+                    <a:ext uri="{9D8B030D-6E8A-4147-A177-3AD203B41FA5}">
+                      <a16:colId xmlns:a16="http://schemas.microsoft.com/office/drawing/2014/main" val="2810028105"/>
+                    </a:ext>
+                  </a:extLst>
+                </a:gridCol>
+              </a:tblGrid>
+              <a:tr h="370840">
+                <a:tc>
+                  <a:txBody>
+                    <a:bodyPr/>
+                    <a:lstStyle/>
+                    <a:p>
+                      <a:pPr algn="ctr"/>
+                      <a:r>
+                        <a:rPr lang="it-IT" b="1" dirty="0"/>
+                        <a:t>Variabile</a:t>
+                      </a:r>
+                    </a:p>
+                  </a:txBody>
+                  <a:tcPr/>
+                </a:tc>
+                <a:tc>
+                  <a:txBody>
+                    <a:bodyPr/>
+                    <a:lstStyle/>
+                    <a:p>
+                      <a:pPr algn="ctr"/>
+                      <a:r>
+                        <a:rPr lang="it-IT" b="1" dirty="0"/>
+                        <a:t>Parametro</a:t>
+                      </a:r>
+                    </a:p>
+                  </a:txBody>
+                  <a:tcPr/>
+                </a:tc>
+                <a:extLst>
+                  <a:ext uri="{0D108BD9-81ED-4DB2-BD59-A6C34878D82A}">
+                    <a16:rowId xmlns:a16="http://schemas.microsoft.com/office/drawing/2014/main" val="1152031263"/>
+                  </a:ext>
+                </a:extLst>
+              </a:tr>
+              <a:tr h="370840">
+                <a:tc>
+                  <a:txBody>
+                    <a:bodyPr/>
+                    <a:lstStyle/>
+                    <a:p>
+                      <a:pPr algn="just"/>
+                      <a:r>
+                        <a:rPr lang="it-IT" b="0" dirty="0" err="1"/>
+                        <a:t>Edges</a:t>
+                      </a:r>
+                      <a:endParaRPr lang="it-IT" b="0" dirty="0"/>
+                    </a:p>
+                  </a:txBody>
+                  <a:tcPr/>
+                </a:tc>
+                <a:tc>
+                  <a:txBody>
+                    <a:bodyPr/>
+                    <a:lstStyle/>
+                    <a:p>
+                      <a:pPr algn="just"/>
+                      <a:r>
+                        <a:rPr lang="it-IT" b="0" dirty="0"/>
+                        <a:t>-2.728 ***</a:t>
+                      </a:r>
+                    </a:p>
+                  </a:txBody>
+                  <a:tcPr/>
+                </a:tc>
+                <a:extLst>
+                  <a:ext uri="{0D108BD9-81ED-4DB2-BD59-A6C34878D82A}">
+                    <a16:rowId xmlns:a16="http://schemas.microsoft.com/office/drawing/2014/main" val="3039372045"/>
+                  </a:ext>
+                </a:extLst>
+              </a:tr>
+              <a:tr h="370840">
+                <a:tc>
+                  <a:txBody>
+                    <a:bodyPr/>
+                    <a:lstStyle/>
+                    <a:p>
+                      <a:pPr algn="just"/>
+                      <a:r>
+                        <a:rPr lang="it-IT" b="0" dirty="0"/>
+                        <a:t>Tipo 1 – </a:t>
+                      </a:r>
+                      <a:r>
+                        <a:rPr lang="it-IT" b="0" dirty="0" err="1"/>
+                        <a:t>Binary</a:t>
+                      </a:r>
+                      <a:r>
+                        <a:rPr lang="it-IT" b="0" dirty="0"/>
+                        <a:t> (Effetto principale)</a:t>
+                      </a:r>
+                    </a:p>
+                  </a:txBody>
+                  <a:tcPr/>
+                </a:tc>
+                <a:tc>
+                  <a:txBody>
+                    <a:bodyPr/>
+                    <a:lstStyle/>
+                    <a:p>
+                      <a:pPr algn="just"/>
+                      <a:r>
+                        <a:rPr lang="it-IT" b="0" dirty="0"/>
+                        <a:t>3.027 ***</a:t>
+                      </a:r>
+                    </a:p>
+                  </a:txBody>
+                  <a:tcPr/>
+                </a:tc>
+                <a:extLst>
+                  <a:ext uri="{0D108BD9-81ED-4DB2-BD59-A6C34878D82A}">
+                    <a16:rowId xmlns:a16="http://schemas.microsoft.com/office/drawing/2014/main" val="3755936523"/>
+                  </a:ext>
+                </a:extLst>
+              </a:tr>
+              <a:tr h="370840">
+                <a:tc>
+                  <a:txBody>
+                    <a:bodyPr/>
+                    <a:lstStyle/>
+                    <a:p>
+                      <a:pPr algn="just"/>
+                      <a:r>
+                        <a:rPr lang="it-IT" b="0" dirty="0"/>
+                        <a:t>Tipo 1 – </a:t>
+                      </a:r>
+                      <a:r>
+                        <a:rPr lang="it-IT" b="0" dirty="0" err="1"/>
+                        <a:t>Binary</a:t>
+                      </a:r>
+                      <a:r>
+                        <a:rPr lang="it-IT" b="0" dirty="0"/>
+                        <a:t> (Omofilia)</a:t>
+                      </a:r>
+                    </a:p>
+                  </a:txBody>
+                  <a:tcPr/>
+                </a:tc>
+                <a:tc>
+                  <a:txBody>
+                    <a:bodyPr/>
+                    <a:lstStyle/>
+                    <a:p>
+                      <a:pPr algn="just"/>
+                      <a:r>
+                        <a:rPr lang="it-IT" b="0" dirty="0"/>
+                        <a:t>-2.737 ***</a:t>
+                      </a:r>
+                    </a:p>
+                  </a:txBody>
+                  <a:tcPr/>
+                </a:tc>
+                <a:extLst>
+                  <a:ext uri="{0D108BD9-81ED-4DB2-BD59-A6C34878D82A}">
+                    <a16:rowId xmlns:a16="http://schemas.microsoft.com/office/drawing/2014/main" val="3798794641"/>
+                  </a:ext>
+                </a:extLst>
+              </a:tr>
+              <a:tr h="370840">
+                <a:tc>
+                  <a:txBody>
+                    <a:bodyPr/>
+                    <a:lstStyle/>
+                    <a:p>
+                      <a:pPr algn="just"/>
+                      <a:r>
+                        <a:rPr lang="it-IT" b="0" dirty="0"/>
+                        <a:t>Tipo 2 – </a:t>
+                      </a:r>
+                      <a:r>
+                        <a:rPr lang="it-IT" b="0" dirty="0" err="1"/>
+                        <a:t>Binary</a:t>
+                      </a:r>
+                      <a:r>
+                        <a:rPr lang="it-IT" b="0" dirty="0"/>
+                        <a:t> (Effetto principale)</a:t>
+                      </a:r>
+                    </a:p>
+                  </a:txBody>
+                  <a:tcPr/>
+                </a:tc>
+                <a:tc>
+                  <a:txBody>
+                    <a:bodyPr/>
+                    <a:lstStyle/>
+                    <a:p>
+                      <a:pPr algn="just"/>
+                      <a:r>
+                        <a:rPr lang="it-IT" b="0" dirty="0"/>
+                        <a:t>-1.075 ***</a:t>
+                      </a:r>
+                    </a:p>
+                  </a:txBody>
+                  <a:tcPr/>
+                </a:tc>
+                <a:extLst>
+                  <a:ext uri="{0D108BD9-81ED-4DB2-BD59-A6C34878D82A}">
+                    <a16:rowId xmlns:a16="http://schemas.microsoft.com/office/drawing/2014/main" val="1899593341"/>
+                  </a:ext>
+                </a:extLst>
+              </a:tr>
+              <a:tr h="370840">
+                <a:tc>
+                  <a:txBody>
+                    <a:bodyPr/>
+                    <a:lstStyle/>
+                    <a:p>
+                      <a:pPr algn="just"/>
+                      <a:r>
+                        <a:rPr lang="it-IT" b="0" dirty="0"/>
+                        <a:t>Stelle in entrata (2)</a:t>
+                      </a:r>
+                    </a:p>
+                  </a:txBody>
+                  <a:tcPr/>
+                </a:tc>
+                <a:tc>
+                  <a:txBody>
+                    <a:bodyPr/>
+                    <a:lstStyle/>
+                    <a:p>
+                      <a:pPr algn="just"/>
+                      <a:r>
+                        <a:rPr lang="it-IT" b="0" dirty="0"/>
+                        <a:t>-3.305 ***</a:t>
+                      </a:r>
+                    </a:p>
+                  </a:txBody>
+                  <a:tcPr/>
+                </a:tc>
+                <a:extLst>
+                  <a:ext uri="{0D108BD9-81ED-4DB2-BD59-A6C34878D82A}">
+                    <a16:rowId xmlns:a16="http://schemas.microsoft.com/office/drawing/2014/main" val="2598691093"/>
+                  </a:ext>
+                </a:extLst>
+              </a:tr>
+            </a:tbl>
+          </a:graphicData>
+        </a:graphic>
+      </p:graphicFrame>
+      <p:sp>
+        <p:nvSpPr>
+          <p:cNvPr id="6" name="CasellaDiTesto 5">
+            <a:extLst>
+              <a:ext uri="{FF2B5EF4-FFF2-40B4-BE49-F238E27FC236}">
+                <a16:creationId xmlns:a16="http://schemas.microsoft.com/office/drawing/2014/main" id="{190BA323-606E-B6F4-C69C-9564E9DA68C5}"/>
+              </a:ext>
+            </a:extLst>
+          </p:cNvPr>
+          <p:cNvSpPr txBox="1"/>
+          <p:nvPr/>
+        </p:nvSpPr>
+        <p:spPr>
+          <a:xfrm>
+            <a:off x="838200" y="4060272"/>
+            <a:ext cx="3426644" cy="307777"/>
+          </a:xfrm>
+          <a:prstGeom prst="rect">
+            <a:avLst/>
+          </a:prstGeom>
+          <a:noFill/>
+        </p:spPr>
+        <p:txBody>
+          <a:bodyPr wrap="none" rtlCol="0">
+            <a:spAutoFit/>
+          </a:bodyPr>
+          <a:lstStyle/>
+          <a:p>
+            <a:r>
+              <a:rPr lang="fr-FR" sz="1400" dirty="0"/>
+              <a:t>’***’p&lt;0.001, ’**’ p&lt;0.01, ’*’ p&lt;0.05 ,’ ’p&lt; 1</a:t>
+            </a:r>
+            <a:endParaRPr lang="it-IT" sz="1400" dirty="0"/>
+          </a:p>
+        </p:txBody>
+      </p:sp>
+    </p:spTree>
+    <p:extLst>
+      <p:ext uri="{BB962C8B-B14F-4D97-AF65-F5344CB8AC3E}">
+        <p14:creationId xmlns:p14="http://schemas.microsoft.com/office/powerpoint/2010/main" val="3834977917"/>
+      </p:ext>
+    </p:extLst>
+  </p:cSld>
+  <p:clrMapOvr>
+    <a:masterClrMapping/>
+  </p:clrMapOvr>
+</p:sld>
+</file>
+
+<file path=ppt/slides/slide13.xml><?xml version="1.0" encoding="utf-8"?>
+<p:sld xmlns:a="http://schemas.openxmlformats.org/drawingml/2006/main" xmlns:r="http://schemas.openxmlformats.org/officeDocument/2006/relationships" xmlns:p="http://schemas.openxmlformats.org/presentationml/2006/main">
+  <p:cSld>
+    <p:spTree>
+      <p:nvGrpSpPr>
+        <p:cNvPr id="1" name=""/>
+        <p:cNvGrpSpPr/>
+        <p:nvPr/>
+      </p:nvGrpSpPr>
+      <p:grpSpPr>
+        <a:xfrm>
+          <a:off x="0" y="0"/>
+          <a:ext cx="0" cy="0"/>
+          <a:chOff x="0" y="0"/>
+          <a:chExt cx="0" cy="0"/>
+        </a:xfrm>
+      </p:grpSpPr>
+      <p:sp>
+        <p:nvSpPr>
+          <p:cNvPr id="2" name="Titolo 1">
+            <a:extLst>
+              <a:ext uri="{FF2B5EF4-FFF2-40B4-BE49-F238E27FC236}">
+                <a16:creationId xmlns:a16="http://schemas.microsoft.com/office/drawing/2014/main" id="{493648D6-83CA-7D37-98A5-FFC0278F9FEF}"/>
+              </a:ext>
+            </a:extLst>
+          </p:cNvPr>
+          <p:cNvSpPr>
+            <a:spLocks noGrp="1"/>
+          </p:cNvSpPr>
+          <p:nvPr>
+            <p:ph type="title"/>
+          </p:nvPr>
+        </p:nvSpPr>
+        <p:spPr>
+          <a:xfrm>
+            <a:off x="838200" y="365126"/>
+            <a:ext cx="10515600" cy="755752"/>
+          </a:xfrm>
+        </p:spPr>
+        <p:txBody>
+          <a:bodyPr/>
+          <a:lstStyle/>
+          <a:p>
+            <a:r>
+              <a:rPr lang="it-IT" dirty="0"/>
+              <a:t>Interpretazione</a:t>
+            </a:r>
+          </a:p>
+        </p:txBody>
+      </p:sp>
+      <p:sp>
+        <p:nvSpPr>
+          <p:cNvPr id="3" name="Segnaposto contenuto 2">
+            <a:extLst>
+              <a:ext uri="{FF2B5EF4-FFF2-40B4-BE49-F238E27FC236}">
+                <a16:creationId xmlns:a16="http://schemas.microsoft.com/office/drawing/2014/main" id="{08D9DF0C-EB37-1B30-C8B5-FF1F3EE148A4}"/>
+              </a:ext>
+            </a:extLst>
+          </p:cNvPr>
+          <p:cNvSpPr>
+            <a:spLocks noGrp="1"/>
+          </p:cNvSpPr>
+          <p:nvPr>
+            <p:ph idx="1"/>
+          </p:nvPr>
+        </p:nvSpPr>
+        <p:spPr>
+          <a:xfrm>
+            <a:off x="838200" y="1307690"/>
+            <a:ext cx="10515600" cy="4869273"/>
+          </a:xfrm>
+        </p:spPr>
+        <p:txBody>
+          <a:bodyPr/>
+          <a:lstStyle/>
+          <a:p>
+            <a:r>
+              <a:rPr lang="it-IT" dirty="0"/>
+              <a:t>Il modello cattura la propensione a non formare legami tra due neuroni</a:t>
+            </a:r>
+          </a:p>
+          <a:p>
+            <a:r>
+              <a:rPr lang="it-IT" dirty="0"/>
+              <a:t>Essere un neurone piramidale aumenta la propensione a formare legami rispetto a non esserlo</a:t>
+            </a:r>
+          </a:p>
+          <a:p>
+            <a:r>
+              <a:rPr lang="it-IT" dirty="0"/>
+              <a:t>C’è una repulsione nel formare legami con neuroni dello stesso tipo, secondo la classificazione funzionale</a:t>
+            </a:r>
+          </a:p>
+          <a:p>
+            <a:r>
+              <a:rPr lang="it-IT" dirty="0"/>
+              <a:t>I neuroni inibitori tendono a formare meno legami rispetto a quelli eccitatori</a:t>
+            </a:r>
+          </a:p>
+          <a:p>
+            <a:endParaRPr lang="it-IT" dirty="0"/>
+          </a:p>
+          <a:p>
+            <a:endParaRPr lang="it-IT" dirty="0"/>
+          </a:p>
+        </p:txBody>
+      </p:sp>
+    </p:spTree>
+    <p:extLst>
+      <p:ext uri="{BB962C8B-B14F-4D97-AF65-F5344CB8AC3E}">
+        <p14:creationId xmlns:p14="http://schemas.microsoft.com/office/powerpoint/2010/main" val="1241603491"/>
+      </p:ext>
+    </p:extLst>
+  </p:cSld>
+  <p:clrMapOvr>
+    <a:masterClrMapping/>
+  </p:clrMapOvr>
+</p:sld>
+</file>
+
+<file path=ppt/slides/slide14.xml><?xml version="1.0" encoding="utf-8"?>
+<p:sld xmlns:a="http://schemas.openxmlformats.org/drawingml/2006/main" xmlns:r="http://schemas.openxmlformats.org/officeDocument/2006/relationships" xmlns:p="http://schemas.openxmlformats.org/presentationml/2006/main">
+  <p:cSld>
+    <p:spTree>
+      <p:nvGrpSpPr>
+        <p:cNvPr id="1" name=""/>
+        <p:cNvGrpSpPr/>
+        <p:nvPr/>
+      </p:nvGrpSpPr>
+      <p:grpSpPr>
+        <a:xfrm>
+          <a:off x="0" y="0"/>
+          <a:ext cx="0" cy="0"/>
+          <a:chOff x="0" y="0"/>
+          <a:chExt cx="0" cy="0"/>
+        </a:xfrm>
+      </p:grpSpPr>
+      <p:sp>
+        <p:nvSpPr>
+          <p:cNvPr id="2" name="Titolo 1">
+            <a:extLst>
+              <a:ext uri="{FF2B5EF4-FFF2-40B4-BE49-F238E27FC236}">
+                <a16:creationId xmlns:a16="http://schemas.microsoft.com/office/drawing/2014/main" id="{BB35A1B8-1E5B-BA51-E17C-2D96FD79B915}"/>
+              </a:ext>
+            </a:extLst>
+          </p:cNvPr>
+          <p:cNvSpPr>
+            <a:spLocks noGrp="1"/>
+          </p:cNvSpPr>
+          <p:nvPr>
+            <p:ph type="title"/>
+          </p:nvPr>
+        </p:nvSpPr>
+        <p:spPr>
+          <a:xfrm>
+            <a:off x="838200" y="365125"/>
+            <a:ext cx="10515600" cy="1108075"/>
+          </a:xfrm>
+        </p:spPr>
+        <p:txBody>
+          <a:bodyPr/>
+          <a:lstStyle/>
+          <a:p>
+            <a:r>
+              <a:rPr lang="it-IT" dirty="0"/>
+              <a:t>Valutazione modello scelto</a:t>
+            </a:r>
+          </a:p>
+        </p:txBody>
+      </p:sp>
+      <p:pic>
+        <p:nvPicPr>
+          <p:cNvPr id="5" name="Segnaposto contenuto 4" descr="Immagine che contiene testo, diagramma, schermata, Piano&#10;&#10;Descrizione generata automaticamente">
+            <a:extLst>
+              <a:ext uri="{FF2B5EF4-FFF2-40B4-BE49-F238E27FC236}">
+                <a16:creationId xmlns:a16="http://schemas.microsoft.com/office/drawing/2014/main" id="{B2D0422A-9431-9C27-C058-251224ECBCBE}"/>
+              </a:ext>
+            </a:extLst>
+          </p:cNvPr>
+          <p:cNvPicPr>
+            <a:picLocks noGrp="1" noChangeAspect="1"/>
+          </p:cNvPicPr>
+          <p:nvPr>
+            <p:ph idx="1"/>
+          </p:nvPr>
+        </p:nvPicPr>
+        <p:blipFill>
+          <a:blip r:embed="rId2">
+            <a:extLst>
+              <a:ext uri="{28A0092B-C50C-407E-A947-70E740481C1C}">
+                <a14:useLocalDpi xmlns:a14="http://schemas.microsoft.com/office/drawing/2010/main" val="0"/>
+              </a:ext>
+            </a:extLst>
+          </a:blip>
+          <a:stretch>
+            <a:fillRect/>
+          </a:stretch>
+        </p:blipFill>
+        <p:spPr>
+          <a:xfrm>
+            <a:off x="2143847" y="1313505"/>
+            <a:ext cx="8219353" cy="4787126"/>
+          </a:xfrm>
+        </p:spPr>
+      </p:pic>
+    </p:spTree>
+    <p:extLst>
+      <p:ext uri="{BB962C8B-B14F-4D97-AF65-F5344CB8AC3E}">
+        <p14:creationId xmlns:p14="http://schemas.microsoft.com/office/powerpoint/2010/main" val="1608257576"/>
+      </p:ext>
+    </p:extLst>
+  </p:cSld>
+  <p:clrMapOvr>
+    <a:masterClrMapping/>
+  </p:clrMapOvr>
+</p:sld>
+</file>
+
+<file path=ppt/slides/slide15.xml><?xml version="1.0" encoding="utf-8"?>
+<p:sld xmlns:a="http://schemas.openxmlformats.org/drawingml/2006/main" xmlns:r="http://schemas.openxmlformats.org/officeDocument/2006/relationships" xmlns:p="http://schemas.openxmlformats.org/presentationml/2006/main">
+  <p:cSld>
+    <p:spTree>
+      <p:nvGrpSpPr>
+        <p:cNvPr id="1" name=""/>
+        <p:cNvGrpSpPr/>
+        <p:nvPr/>
+      </p:nvGrpSpPr>
+      <p:grpSpPr>
+        <a:xfrm>
+          <a:off x="0" y="0"/>
+          <a:ext cx="0" cy="0"/>
+          <a:chOff x="0" y="0"/>
+          <a:chExt cx="0" cy="0"/>
+        </a:xfrm>
+      </p:grpSpPr>
+      <p:sp>
+        <p:nvSpPr>
+          <p:cNvPr id="2" name="Titolo 1">
+            <a:extLst>
+              <a:ext uri="{FF2B5EF4-FFF2-40B4-BE49-F238E27FC236}">
+                <a16:creationId xmlns:a16="http://schemas.microsoft.com/office/drawing/2014/main" id="{9481B6C9-352C-20FC-135E-B3A7C4A16A33}"/>
+              </a:ext>
+            </a:extLst>
+          </p:cNvPr>
+          <p:cNvSpPr>
+            <a:spLocks noGrp="1"/>
+          </p:cNvSpPr>
+          <p:nvPr>
+            <p:ph type="title"/>
+          </p:nvPr>
+        </p:nvSpPr>
+        <p:spPr/>
+        <p:txBody>
+          <a:bodyPr/>
+          <a:lstStyle/>
+          <a:p>
+            <a:r>
+              <a:rPr lang="it-IT" dirty="0"/>
+              <a:t>Conclusioni</a:t>
+            </a:r>
+          </a:p>
+        </p:txBody>
+      </p:sp>
+      <p:sp>
+        <p:nvSpPr>
+          <p:cNvPr id="3" name="Segnaposto contenuto 2">
+            <a:extLst>
+              <a:ext uri="{FF2B5EF4-FFF2-40B4-BE49-F238E27FC236}">
+                <a16:creationId xmlns:a16="http://schemas.microsoft.com/office/drawing/2014/main" id="{D2223959-EC9C-1F16-34D8-00AF2875FC9B}"/>
+              </a:ext>
+            </a:extLst>
+          </p:cNvPr>
+          <p:cNvSpPr>
+            <a:spLocks noGrp="1"/>
+          </p:cNvSpPr>
+          <p:nvPr>
+            <p:ph idx="1"/>
+          </p:nvPr>
+        </p:nvSpPr>
+        <p:spPr>
+          <a:xfrm>
+            <a:off x="838200" y="1554480"/>
+            <a:ext cx="10515600" cy="4622483"/>
+          </a:xfrm>
+        </p:spPr>
+        <p:txBody>
+          <a:bodyPr/>
+          <a:lstStyle/>
+          <a:p>
+            <a:r>
+              <a:rPr lang="it-IT" dirty="0"/>
+              <a:t>Come noto prima dell’approfondimento, la rete neurale del topo è molto sparsa, e i pochi segnali partono dai neuroni piramidali</a:t>
+            </a:r>
+          </a:p>
+          <a:p>
+            <a:r>
+              <a:rPr lang="it-IT" dirty="0"/>
+              <a:t>Con gli strumenti attuali, non riusciamo a catturare la struttura a stella in uscita per problemi di </a:t>
+            </a:r>
+            <a:r>
+              <a:rPr lang="it-IT" dirty="0" err="1"/>
+              <a:t>degeneracy</a:t>
+            </a:r>
+            <a:endParaRPr lang="it-IT" dirty="0"/>
+          </a:p>
+          <a:p>
+            <a:r>
+              <a:rPr lang="it-IT" dirty="0"/>
+              <a:t>Da ciò consegue che il modello non è ancora coerente con la variabilità di grado in uscita osservata</a:t>
+            </a:r>
+          </a:p>
+          <a:p>
+            <a:endParaRPr lang="it-IT" dirty="0"/>
+          </a:p>
+          <a:p>
+            <a:pPr marL="0" indent="0">
+              <a:buNone/>
+            </a:pPr>
+            <a:endParaRPr lang="it-IT" dirty="0"/>
+          </a:p>
+        </p:txBody>
+      </p:sp>
+    </p:spTree>
+    <p:extLst>
+      <p:ext uri="{BB962C8B-B14F-4D97-AF65-F5344CB8AC3E}">
+        <p14:creationId xmlns:p14="http://schemas.microsoft.com/office/powerpoint/2010/main" val="2930151965"/>
+      </p:ext>
+    </p:extLst>
+  </p:cSld>
+  <p:clrMapOvr>
+    <a:masterClrMapping/>
+  </p:clrMapOvr>
+</p:sld>
+</file>
+
 <file path=ppt/slides/slide2.xml><?xml version="1.0" encoding="utf-8"?>
 <p:sld xmlns:a="http://schemas.openxmlformats.org/drawingml/2006/main" xmlns:r="http://schemas.openxmlformats.org/officeDocument/2006/relationships" xmlns:p="http://schemas.openxmlformats.org/presentationml/2006/main">
   <p:cSld>
@@ -9000,8 +9931,8 @@
         </p:nvSpPr>
         <p:spPr>
           <a:xfrm>
-            <a:off x="838200" y="2434201"/>
-            <a:ext cx="3822189" cy="3742762"/>
+            <a:off x="838200" y="2133600"/>
+            <a:ext cx="3822189" cy="4043363"/>
           </a:xfrm>
         </p:spPr>
         <p:txBody>
@@ -9011,27 +9942,27 @@
           <a:lstStyle/>
           <a:p>
             <a:r>
-              <a:rPr lang="it-IT" sz="1900"/>
+              <a:rPr lang="it-IT" sz="1900" dirty="0"/>
               <a:t>Il paper utilizza i dati per comprendere meglio la struttura della corteccia visiva</a:t>
             </a:r>
           </a:p>
           <a:p>
             <a:r>
-              <a:rPr lang="it-IT" sz="1900"/>
+              <a:rPr lang="it-IT" sz="1900" dirty="0"/>
               <a:t>Il nostro obbiettivo è quello di proseguire il lavoro, costruendo un modello che sia rappresentativo per la rete in questione</a:t>
             </a:r>
           </a:p>
           <a:p>
             <a:r>
-              <a:rPr lang="it-IT" sz="1900"/>
+              <a:rPr lang="it-IT" sz="1900" dirty="0"/>
               <a:t>In particolare, cerchiamo di comprendere la variabilità nella regolarizzazione dell’attività neuronale da parte dei target</a:t>
             </a:r>
           </a:p>
           <a:p>
-            <a:endParaRPr lang="it-IT" sz="1900"/>
-          </a:p>
-          <a:p>
-            <a:endParaRPr lang="it-IT" sz="1900"/>
+            <a:endParaRPr lang="it-IT" sz="1900" dirty="0"/>
+          </a:p>
+          <a:p>
+            <a:endParaRPr lang="it-IT" sz="1900" dirty="0"/>
           </a:p>
         </p:txBody>
       </p:sp>
@@ -9886,6 +10817,100 @@
     <p:extLst>
       <p:ext uri="{BB962C8B-B14F-4D97-AF65-F5344CB8AC3E}">
         <p14:creationId xmlns:p14="http://schemas.microsoft.com/office/powerpoint/2010/main" val="157106537"/>
+      </p:ext>
+    </p:extLst>
+  </p:cSld>
+  <p:clrMapOvr>
+    <a:masterClrMapping/>
+  </p:clrMapOvr>
+</p:sld>
+</file>
+
+<file path=ppt/slides/slide9.xml><?xml version="1.0" encoding="utf-8"?>
+<p:sld xmlns:a="http://schemas.openxmlformats.org/drawingml/2006/main" xmlns:r="http://schemas.openxmlformats.org/officeDocument/2006/relationships" xmlns:p="http://schemas.openxmlformats.org/presentationml/2006/main">
+  <p:cSld>
+    <p:spTree>
+      <p:nvGrpSpPr>
+        <p:cNvPr id="1" name=""/>
+        <p:cNvGrpSpPr/>
+        <p:nvPr/>
+      </p:nvGrpSpPr>
+      <p:grpSpPr>
+        <a:xfrm>
+          <a:off x="0" y="0"/>
+          <a:ext cx="0" cy="0"/>
+          <a:chOff x="0" y="0"/>
+          <a:chExt cx="0" cy="0"/>
+        </a:xfrm>
+      </p:grpSpPr>
+      <p:sp>
+        <p:nvSpPr>
+          <p:cNvPr id="2" name="Titolo 1">
+            <a:extLst>
+              <a:ext uri="{FF2B5EF4-FFF2-40B4-BE49-F238E27FC236}">
+                <a16:creationId xmlns:a16="http://schemas.microsoft.com/office/drawing/2014/main" id="{062A888F-3306-FEE4-A77A-087DA7B1F378}"/>
+              </a:ext>
+            </a:extLst>
+          </p:cNvPr>
+          <p:cNvSpPr>
+            <a:spLocks noGrp="1"/>
+          </p:cNvSpPr>
+          <p:nvPr>
+            <p:ph type="title"/>
+          </p:nvPr>
+        </p:nvSpPr>
+        <p:spPr/>
+        <p:txBody>
+          <a:bodyPr/>
+          <a:lstStyle/>
+          <a:p>
+            <a:r>
+              <a:rPr lang="it-IT"/>
+              <a:t>Simulazione con SRG</a:t>
+            </a:r>
+            <a:endParaRPr lang="it-IT" dirty="0"/>
+          </a:p>
+        </p:txBody>
+      </p:sp>
+      <p:pic>
+        <p:nvPicPr>
+          <p:cNvPr id="5" name="Segnaposto contenuto 4" descr="Immagine che contiene testo, diagramma, Disegno tecnico, schizzo&#10;&#10;Descrizione generata automaticamente">
+            <a:extLst>
+              <a:ext uri="{FF2B5EF4-FFF2-40B4-BE49-F238E27FC236}">
+                <a16:creationId xmlns:a16="http://schemas.microsoft.com/office/drawing/2014/main" id="{BD8867E8-B0C3-623E-5B99-6D2322841922}"/>
+              </a:ext>
+            </a:extLst>
+          </p:cNvPr>
+          <p:cNvPicPr>
+            <a:picLocks noGrp="1" noChangeAspect="1"/>
+          </p:cNvPicPr>
+          <p:nvPr>
+            <p:ph idx="1"/>
+          </p:nvPr>
+        </p:nvPicPr>
+        <p:blipFill>
+          <a:blip r:embed="rId2">
+            <a:extLst>
+              <a:ext uri="{28A0092B-C50C-407E-A947-70E740481C1C}">
+                <a14:useLocalDpi xmlns:a14="http://schemas.microsoft.com/office/drawing/2010/main" val="0"/>
+              </a:ext>
+            </a:extLst>
+          </a:blip>
+          <a:stretch>
+            <a:fillRect/>
+          </a:stretch>
+        </p:blipFill>
+        <p:spPr>
+          <a:xfrm>
+            <a:off x="1731962" y="1482883"/>
+            <a:ext cx="8553991" cy="3892233"/>
+          </a:xfrm>
+        </p:spPr>
+      </p:pic>
+    </p:spTree>
+    <p:extLst>
+      <p:ext uri="{BB962C8B-B14F-4D97-AF65-F5344CB8AC3E}">
+        <p14:creationId xmlns:p14="http://schemas.microsoft.com/office/powerpoint/2010/main" val="1843321786"/>
       </p:ext>
     </p:extLst>
   </p:cSld>

</xml_diff>